<commit_message>
new pdf and pptx
</commit_message>
<xml_diff>
--- a/slides/slides.pptx
+++ b/slides/slides.pptx
@@ -24,16 +24,6 @@
     <p:sldId id="272" r:id="rId19"/>
     <p:sldId id="273" r:id="rId20"/>
     <p:sldId id="274" r:id="rId21"/>
-    <p:sldId id="275" r:id="rId22"/>
-    <p:sldId id="276" r:id="rId23"/>
-    <p:sldId id="277" r:id="rId24"/>
-    <p:sldId id="278" r:id="rId25"/>
-    <p:sldId id="279" r:id="rId26"/>
-    <p:sldId id="280" r:id="rId27"/>
-    <p:sldId id="281" r:id="rId28"/>
-    <p:sldId id="282" r:id="rId29"/>
-    <p:sldId id="283" r:id="rId30"/>
-    <p:sldId id="284" r:id="rId31"/>
   </p:sldIdLst>
   <p:sldSz cx="10080625" cy="7559675"/>
   <p:notesSz cx="7559675" cy="10691812"/>
@@ -1442,7 +1432,13 @@
               <a:rPr b="0" lang="en-US" sz="5870" spc="-1" strike="noStrike">
                 <a:latin typeface="Arial"/>
               </a:rPr>
-              <a:t>Click to edit the title text format</a:t>
+              <a:t>Click to edit the title text </a:t>
+            </a:r>
+            <a:r>
+              <a:rPr b="0" lang="en-US" sz="5870" spc="-1" strike="noStrike">
+                <a:latin typeface="Arial"/>
+              </a:rPr>
+              <a:t>format</a:t>
             </a:r>
             <a:endParaRPr b="0" lang="en-US" sz="5870" spc="-1" strike="noStrike">
               <a:latin typeface="Arial"/>
@@ -1727,7 +1723,7 @@
           </a:bodyPr>
           <a:p>
             <a:pPr algn="r"/>
-            <a:fld id="{A42D579E-3831-4351-96A7-0A856C599F19}" type="slidenum">
+            <a:fld id="{A20F1729-C7C0-4E15-826D-F91C8A79EDC2}" type="slidenum">
               <a:rPr b="0" lang="en-US" sz="1400" spc="-1" strike="noStrike">
                 <a:latin typeface="Times New Roman"/>
               </a:rPr>
@@ -2362,536 +2358,6 @@
       <p:pic>
         <p:nvPicPr>
           <p:cNvPr id="42" name="" descr=""/>
-          <p:cNvPicPr/>
-          <p:nvPr/>
-        </p:nvPicPr>
-        <p:blipFill>
-          <a:blip r:embed="rId1"/>
-          <a:stretch/>
-        </p:blipFill>
-        <p:spPr>
-          <a:xfrm>
-            <a:off x="0" y="-720"/>
-            <a:ext cx="10080000" cy="7561440"/>
-          </a:xfrm>
-          <a:prstGeom prst="rect">
-            <a:avLst/>
-          </a:prstGeom>
-          <a:ln w="0">
-            <a:noFill/>
-          </a:ln>
-        </p:spPr>
-      </p:pic>
-    </p:spTree>
-  </p:cSld>
-  <mc:AlternateContent>
-    <mc:Choice Requires="p14">
-      <p:transition spd="slow" p14:dur="2000"/>
-    </mc:Choice>
-    <mc:Fallback>
-      <p:transition spd="slow"/>
-    </mc:Fallback>
-  </mc:AlternateContent>
-</p:sld>
-</file>
-
-<file path=ppt/slides/slide20.xml><?xml version="1.0" encoding="utf-8"?>
-<p:sld xmlns:a="http://schemas.openxmlformats.org/drawingml/2006/main" xmlns:p="http://schemas.openxmlformats.org/presentationml/2006/main" xmlns:r="http://schemas.openxmlformats.org/officeDocument/2006/relationships" xmlns:p14="http://schemas.microsoft.com/office/powerpoint/2010/main" xmlns:p15="http://schemas.microsoft.com/office/powerpoint/2012/main" xmlns:mc="http://schemas.openxmlformats.org/markup-compatibility/2006">
-  <p:cSld>
-    <p:spTree>
-      <p:nvGrpSpPr>
-        <p:cNvPr id="1" name=""/>
-        <p:cNvGrpSpPr/>
-        <p:nvPr/>
-      </p:nvGrpSpPr>
-      <p:grpSpPr>
-        <a:xfrm>
-          <a:off x="0" y="0"/>
-          <a:ext cx="0" cy="0"/>
-          <a:chOff x="0" y="0"/>
-          <a:chExt cx="0" cy="0"/>
-        </a:xfrm>
-      </p:grpSpPr>
-      <p:pic>
-        <p:nvPicPr>
-          <p:cNvPr id="60" name="" descr=""/>
-          <p:cNvPicPr/>
-          <p:nvPr/>
-        </p:nvPicPr>
-        <p:blipFill>
-          <a:blip r:embed="rId1"/>
-          <a:stretch/>
-        </p:blipFill>
-        <p:spPr>
-          <a:xfrm>
-            <a:off x="0" y="-720"/>
-            <a:ext cx="10080000" cy="7561440"/>
-          </a:xfrm>
-          <a:prstGeom prst="rect">
-            <a:avLst/>
-          </a:prstGeom>
-          <a:ln w="0">
-            <a:noFill/>
-          </a:ln>
-        </p:spPr>
-      </p:pic>
-    </p:spTree>
-  </p:cSld>
-  <mc:AlternateContent>
-    <mc:Choice Requires="p14">
-      <p:transition spd="slow" p14:dur="2000"/>
-    </mc:Choice>
-    <mc:Fallback>
-      <p:transition spd="slow"/>
-    </mc:Fallback>
-  </mc:AlternateContent>
-</p:sld>
-</file>
-
-<file path=ppt/slides/slide21.xml><?xml version="1.0" encoding="utf-8"?>
-<p:sld xmlns:a="http://schemas.openxmlformats.org/drawingml/2006/main" xmlns:p="http://schemas.openxmlformats.org/presentationml/2006/main" xmlns:r="http://schemas.openxmlformats.org/officeDocument/2006/relationships" xmlns:p14="http://schemas.microsoft.com/office/powerpoint/2010/main" xmlns:p15="http://schemas.microsoft.com/office/powerpoint/2012/main" xmlns:mc="http://schemas.openxmlformats.org/markup-compatibility/2006">
-  <p:cSld>
-    <p:spTree>
-      <p:nvGrpSpPr>
-        <p:cNvPr id="1" name=""/>
-        <p:cNvGrpSpPr/>
-        <p:nvPr/>
-      </p:nvGrpSpPr>
-      <p:grpSpPr>
-        <a:xfrm>
-          <a:off x="0" y="0"/>
-          <a:ext cx="0" cy="0"/>
-          <a:chOff x="0" y="0"/>
-          <a:chExt cx="0" cy="0"/>
-        </a:xfrm>
-      </p:grpSpPr>
-      <p:pic>
-        <p:nvPicPr>
-          <p:cNvPr id="61" name="" descr=""/>
-          <p:cNvPicPr/>
-          <p:nvPr/>
-        </p:nvPicPr>
-        <p:blipFill>
-          <a:blip r:embed="rId1"/>
-          <a:stretch/>
-        </p:blipFill>
-        <p:spPr>
-          <a:xfrm>
-            <a:off x="0" y="-720"/>
-            <a:ext cx="10080000" cy="7561440"/>
-          </a:xfrm>
-          <a:prstGeom prst="rect">
-            <a:avLst/>
-          </a:prstGeom>
-          <a:ln w="0">
-            <a:noFill/>
-          </a:ln>
-        </p:spPr>
-      </p:pic>
-    </p:spTree>
-  </p:cSld>
-  <mc:AlternateContent>
-    <mc:Choice Requires="p14">
-      <p:transition spd="slow" p14:dur="2000"/>
-    </mc:Choice>
-    <mc:Fallback>
-      <p:transition spd="slow"/>
-    </mc:Fallback>
-  </mc:AlternateContent>
-</p:sld>
-</file>
-
-<file path=ppt/slides/slide22.xml><?xml version="1.0" encoding="utf-8"?>
-<p:sld xmlns:a="http://schemas.openxmlformats.org/drawingml/2006/main" xmlns:p="http://schemas.openxmlformats.org/presentationml/2006/main" xmlns:r="http://schemas.openxmlformats.org/officeDocument/2006/relationships" xmlns:p14="http://schemas.microsoft.com/office/powerpoint/2010/main" xmlns:p15="http://schemas.microsoft.com/office/powerpoint/2012/main" xmlns:mc="http://schemas.openxmlformats.org/markup-compatibility/2006">
-  <p:cSld>
-    <p:spTree>
-      <p:nvGrpSpPr>
-        <p:cNvPr id="1" name=""/>
-        <p:cNvGrpSpPr/>
-        <p:nvPr/>
-      </p:nvGrpSpPr>
-      <p:grpSpPr>
-        <a:xfrm>
-          <a:off x="0" y="0"/>
-          <a:ext cx="0" cy="0"/>
-          <a:chOff x="0" y="0"/>
-          <a:chExt cx="0" cy="0"/>
-        </a:xfrm>
-      </p:grpSpPr>
-      <p:pic>
-        <p:nvPicPr>
-          <p:cNvPr id="62" name="" descr=""/>
-          <p:cNvPicPr/>
-          <p:nvPr/>
-        </p:nvPicPr>
-        <p:blipFill>
-          <a:blip r:embed="rId1"/>
-          <a:stretch/>
-        </p:blipFill>
-        <p:spPr>
-          <a:xfrm>
-            <a:off x="0" y="-720"/>
-            <a:ext cx="10080000" cy="7561440"/>
-          </a:xfrm>
-          <a:prstGeom prst="rect">
-            <a:avLst/>
-          </a:prstGeom>
-          <a:ln w="0">
-            <a:noFill/>
-          </a:ln>
-        </p:spPr>
-      </p:pic>
-    </p:spTree>
-  </p:cSld>
-  <mc:AlternateContent>
-    <mc:Choice Requires="p14">
-      <p:transition spd="slow" p14:dur="2000"/>
-    </mc:Choice>
-    <mc:Fallback>
-      <p:transition spd="slow"/>
-    </mc:Fallback>
-  </mc:AlternateContent>
-</p:sld>
-</file>
-
-<file path=ppt/slides/slide23.xml><?xml version="1.0" encoding="utf-8"?>
-<p:sld xmlns:a="http://schemas.openxmlformats.org/drawingml/2006/main" xmlns:p="http://schemas.openxmlformats.org/presentationml/2006/main" xmlns:r="http://schemas.openxmlformats.org/officeDocument/2006/relationships" xmlns:p14="http://schemas.microsoft.com/office/powerpoint/2010/main" xmlns:p15="http://schemas.microsoft.com/office/powerpoint/2012/main" xmlns:mc="http://schemas.openxmlformats.org/markup-compatibility/2006">
-  <p:cSld>
-    <p:spTree>
-      <p:nvGrpSpPr>
-        <p:cNvPr id="1" name=""/>
-        <p:cNvGrpSpPr/>
-        <p:nvPr/>
-      </p:nvGrpSpPr>
-      <p:grpSpPr>
-        <a:xfrm>
-          <a:off x="0" y="0"/>
-          <a:ext cx="0" cy="0"/>
-          <a:chOff x="0" y="0"/>
-          <a:chExt cx="0" cy="0"/>
-        </a:xfrm>
-      </p:grpSpPr>
-      <p:pic>
-        <p:nvPicPr>
-          <p:cNvPr id="63" name="" descr=""/>
-          <p:cNvPicPr/>
-          <p:nvPr/>
-        </p:nvPicPr>
-        <p:blipFill>
-          <a:blip r:embed="rId1"/>
-          <a:stretch/>
-        </p:blipFill>
-        <p:spPr>
-          <a:xfrm>
-            <a:off x="0" y="-720"/>
-            <a:ext cx="10080000" cy="7561440"/>
-          </a:xfrm>
-          <a:prstGeom prst="rect">
-            <a:avLst/>
-          </a:prstGeom>
-          <a:ln w="0">
-            <a:noFill/>
-          </a:ln>
-        </p:spPr>
-      </p:pic>
-    </p:spTree>
-  </p:cSld>
-  <mc:AlternateContent>
-    <mc:Choice Requires="p14">
-      <p:transition spd="slow" p14:dur="2000"/>
-    </mc:Choice>
-    <mc:Fallback>
-      <p:transition spd="slow"/>
-    </mc:Fallback>
-  </mc:AlternateContent>
-</p:sld>
-</file>
-
-<file path=ppt/slides/slide24.xml><?xml version="1.0" encoding="utf-8"?>
-<p:sld xmlns:a="http://schemas.openxmlformats.org/drawingml/2006/main" xmlns:p="http://schemas.openxmlformats.org/presentationml/2006/main" xmlns:r="http://schemas.openxmlformats.org/officeDocument/2006/relationships" xmlns:p14="http://schemas.microsoft.com/office/powerpoint/2010/main" xmlns:p15="http://schemas.microsoft.com/office/powerpoint/2012/main" xmlns:mc="http://schemas.openxmlformats.org/markup-compatibility/2006">
-  <p:cSld>
-    <p:spTree>
-      <p:nvGrpSpPr>
-        <p:cNvPr id="1" name=""/>
-        <p:cNvGrpSpPr/>
-        <p:nvPr/>
-      </p:nvGrpSpPr>
-      <p:grpSpPr>
-        <a:xfrm>
-          <a:off x="0" y="0"/>
-          <a:ext cx="0" cy="0"/>
-          <a:chOff x="0" y="0"/>
-          <a:chExt cx="0" cy="0"/>
-        </a:xfrm>
-      </p:grpSpPr>
-      <p:pic>
-        <p:nvPicPr>
-          <p:cNvPr id="64" name="" descr=""/>
-          <p:cNvPicPr/>
-          <p:nvPr/>
-        </p:nvPicPr>
-        <p:blipFill>
-          <a:blip r:embed="rId1"/>
-          <a:stretch/>
-        </p:blipFill>
-        <p:spPr>
-          <a:xfrm>
-            <a:off x="0" y="-720"/>
-            <a:ext cx="10080000" cy="7561440"/>
-          </a:xfrm>
-          <a:prstGeom prst="rect">
-            <a:avLst/>
-          </a:prstGeom>
-          <a:ln w="0">
-            <a:noFill/>
-          </a:ln>
-        </p:spPr>
-      </p:pic>
-    </p:spTree>
-  </p:cSld>
-  <mc:AlternateContent>
-    <mc:Choice Requires="p14">
-      <p:transition spd="slow" p14:dur="2000"/>
-    </mc:Choice>
-    <mc:Fallback>
-      <p:transition spd="slow"/>
-    </mc:Fallback>
-  </mc:AlternateContent>
-</p:sld>
-</file>
-
-<file path=ppt/slides/slide25.xml><?xml version="1.0" encoding="utf-8"?>
-<p:sld xmlns:a="http://schemas.openxmlformats.org/drawingml/2006/main" xmlns:p="http://schemas.openxmlformats.org/presentationml/2006/main" xmlns:r="http://schemas.openxmlformats.org/officeDocument/2006/relationships" xmlns:p14="http://schemas.microsoft.com/office/powerpoint/2010/main" xmlns:p15="http://schemas.microsoft.com/office/powerpoint/2012/main" xmlns:mc="http://schemas.openxmlformats.org/markup-compatibility/2006">
-  <p:cSld>
-    <p:spTree>
-      <p:nvGrpSpPr>
-        <p:cNvPr id="1" name=""/>
-        <p:cNvGrpSpPr/>
-        <p:nvPr/>
-      </p:nvGrpSpPr>
-      <p:grpSpPr>
-        <a:xfrm>
-          <a:off x="0" y="0"/>
-          <a:ext cx="0" cy="0"/>
-          <a:chOff x="0" y="0"/>
-          <a:chExt cx="0" cy="0"/>
-        </a:xfrm>
-      </p:grpSpPr>
-      <p:pic>
-        <p:nvPicPr>
-          <p:cNvPr id="65" name="" descr=""/>
-          <p:cNvPicPr/>
-          <p:nvPr/>
-        </p:nvPicPr>
-        <p:blipFill>
-          <a:blip r:embed="rId1"/>
-          <a:stretch/>
-        </p:blipFill>
-        <p:spPr>
-          <a:xfrm>
-            <a:off x="0" y="-720"/>
-            <a:ext cx="10080000" cy="7561440"/>
-          </a:xfrm>
-          <a:prstGeom prst="rect">
-            <a:avLst/>
-          </a:prstGeom>
-          <a:ln w="0">
-            <a:noFill/>
-          </a:ln>
-        </p:spPr>
-      </p:pic>
-    </p:spTree>
-  </p:cSld>
-  <mc:AlternateContent>
-    <mc:Choice Requires="p14">
-      <p:transition spd="slow" p14:dur="2000"/>
-    </mc:Choice>
-    <mc:Fallback>
-      <p:transition spd="slow"/>
-    </mc:Fallback>
-  </mc:AlternateContent>
-</p:sld>
-</file>
-
-<file path=ppt/slides/slide26.xml><?xml version="1.0" encoding="utf-8"?>
-<p:sld xmlns:a="http://schemas.openxmlformats.org/drawingml/2006/main" xmlns:p="http://schemas.openxmlformats.org/presentationml/2006/main" xmlns:r="http://schemas.openxmlformats.org/officeDocument/2006/relationships" xmlns:p14="http://schemas.microsoft.com/office/powerpoint/2010/main" xmlns:p15="http://schemas.microsoft.com/office/powerpoint/2012/main" xmlns:mc="http://schemas.openxmlformats.org/markup-compatibility/2006">
-  <p:cSld>
-    <p:spTree>
-      <p:nvGrpSpPr>
-        <p:cNvPr id="1" name=""/>
-        <p:cNvGrpSpPr/>
-        <p:nvPr/>
-      </p:nvGrpSpPr>
-      <p:grpSpPr>
-        <a:xfrm>
-          <a:off x="0" y="0"/>
-          <a:ext cx="0" cy="0"/>
-          <a:chOff x="0" y="0"/>
-          <a:chExt cx="0" cy="0"/>
-        </a:xfrm>
-      </p:grpSpPr>
-      <p:pic>
-        <p:nvPicPr>
-          <p:cNvPr id="66" name="" descr=""/>
-          <p:cNvPicPr/>
-          <p:nvPr/>
-        </p:nvPicPr>
-        <p:blipFill>
-          <a:blip r:embed="rId1"/>
-          <a:stretch/>
-        </p:blipFill>
-        <p:spPr>
-          <a:xfrm>
-            <a:off x="0" y="-720"/>
-            <a:ext cx="10080000" cy="7561440"/>
-          </a:xfrm>
-          <a:prstGeom prst="rect">
-            <a:avLst/>
-          </a:prstGeom>
-          <a:ln w="0">
-            <a:noFill/>
-          </a:ln>
-        </p:spPr>
-      </p:pic>
-    </p:spTree>
-  </p:cSld>
-  <mc:AlternateContent>
-    <mc:Choice Requires="p14">
-      <p:transition spd="slow" p14:dur="2000"/>
-    </mc:Choice>
-    <mc:Fallback>
-      <p:transition spd="slow"/>
-    </mc:Fallback>
-  </mc:AlternateContent>
-</p:sld>
-</file>
-
-<file path=ppt/slides/slide27.xml><?xml version="1.0" encoding="utf-8"?>
-<p:sld xmlns:a="http://schemas.openxmlformats.org/drawingml/2006/main" xmlns:p="http://schemas.openxmlformats.org/presentationml/2006/main" xmlns:r="http://schemas.openxmlformats.org/officeDocument/2006/relationships" xmlns:p14="http://schemas.microsoft.com/office/powerpoint/2010/main" xmlns:p15="http://schemas.microsoft.com/office/powerpoint/2012/main" xmlns:mc="http://schemas.openxmlformats.org/markup-compatibility/2006">
-  <p:cSld>
-    <p:spTree>
-      <p:nvGrpSpPr>
-        <p:cNvPr id="1" name=""/>
-        <p:cNvGrpSpPr/>
-        <p:nvPr/>
-      </p:nvGrpSpPr>
-      <p:grpSpPr>
-        <a:xfrm>
-          <a:off x="0" y="0"/>
-          <a:ext cx="0" cy="0"/>
-          <a:chOff x="0" y="0"/>
-          <a:chExt cx="0" cy="0"/>
-        </a:xfrm>
-      </p:grpSpPr>
-      <p:pic>
-        <p:nvPicPr>
-          <p:cNvPr id="67" name="" descr=""/>
-          <p:cNvPicPr/>
-          <p:nvPr/>
-        </p:nvPicPr>
-        <p:blipFill>
-          <a:blip r:embed="rId1"/>
-          <a:stretch/>
-        </p:blipFill>
-        <p:spPr>
-          <a:xfrm>
-            <a:off x="0" y="-720"/>
-            <a:ext cx="10080000" cy="7561440"/>
-          </a:xfrm>
-          <a:prstGeom prst="rect">
-            <a:avLst/>
-          </a:prstGeom>
-          <a:ln w="0">
-            <a:noFill/>
-          </a:ln>
-        </p:spPr>
-      </p:pic>
-    </p:spTree>
-  </p:cSld>
-  <mc:AlternateContent>
-    <mc:Choice Requires="p14">
-      <p:transition spd="slow" p14:dur="2000"/>
-    </mc:Choice>
-    <mc:Fallback>
-      <p:transition spd="slow"/>
-    </mc:Fallback>
-  </mc:AlternateContent>
-</p:sld>
-</file>
-
-<file path=ppt/slides/slide28.xml><?xml version="1.0" encoding="utf-8"?>
-<p:sld xmlns:a="http://schemas.openxmlformats.org/drawingml/2006/main" xmlns:p="http://schemas.openxmlformats.org/presentationml/2006/main" xmlns:r="http://schemas.openxmlformats.org/officeDocument/2006/relationships" xmlns:p14="http://schemas.microsoft.com/office/powerpoint/2010/main" xmlns:p15="http://schemas.microsoft.com/office/powerpoint/2012/main" xmlns:mc="http://schemas.openxmlformats.org/markup-compatibility/2006">
-  <p:cSld>
-    <p:spTree>
-      <p:nvGrpSpPr>
-        <p:cNvPr id="1" name=""/>
-        <p:cNvGrpSpPr/>
-        <p:nvPr/>
-      </p:nvGrpSpPr>
-      <p:grpSpPr>
-        <a:xfrm>
-          <a:off x="0" y="0"/>
-          <a:ext cx="0" cy="0"/>
-          <a:chOff x="0" y="0"/>
-          <a:chExt cx="0" cy="0"/>
-        </a:xfrm>
-      </p:grpSpPr>
-      <p:pic>
-        <p:nvPicPr>
-          <p:cNvPr id="68" name="" descr=""/>
-          <p:cNvPicPr/>
-          <p:nvPr/>
-        </p:nvPicPr>
-        <p:blipFill>
-          <a:blip r:embed="rId1"/>
-          <a:stretch/>
-        </p:blipFill>
-        <p:spPr>
-          <a:xfrm>
-            <a:off x="0" y="-720"/>
-            <a:ext cx="10080000" cy="7561440"/>
-          </a:xfrm>
-          <a:prstGeom prst="rect">
-            <a:avLst/>
-          </a:prstGeom>
-          <a:ln w="0">
-            <a:noFill/>
-          </a:ln>
-        </p:spPr>
-      </p:pic>
-    </p:spTree>
-  </p:cSld>
-  <mc:AlternateContent>
-    <mc:Choice Requires="p14">
-      <p:transition spd="slow" p14:dur="2000"/>
-    </mc:Choice>
-    <mc:Fallback>
-      <p:transition spd="slow"/>
-    </mc:Fallback>
-  </mc:AlternateContent>
-</p:sld>
-</file>
-
-<file path=ppt/slides/slide29.xml><?xml version="1.0" encoding="utf-8"?>
-<p:sld xmlns:a="http://schemas.openxmlformats.org/drawingml/2006/main" xmlns:p="http://schemas.openxmlformats.org/presentationml/2006/main" xmlns:r="http://schemas.openxmlformats.org/officeDocument/2006/relationships" xmlns:p14="http://schemas.microsoft.com/office/powerpoint/2010/main" xmlns:p15="http://schemas.microsoft.com/office/powerpoint/2012/main" xmlns:mc="http://schemas.openxmlformats.org/markup-compatibility/2006">
-  <p:cSld>
-    <p:spTree>
-      <p:nvGrpSpPr>
-        <p:cNvPr id="1" name=""/>
-        <p:cNvGrpSpPr/>
-        <p:nvPr/>
-      </p:nvGrpSpPr>
-      <p:grpSpPr>
-        <a:xfrm>
-          <a:off x="0" y="0"/>
-          <a:ext cx="0" cy="0"/>
-          <a:chOff x="0" y="0"/>
-          <a:chExt cx="0" cy="0"/>
-        </a:xfrm>
-      </p:grpSpPr>
-      <p:pic>
-        <p:nvPicPr>
-          <p:cNvPr id="69" name="" descr=""/>
           <p:cNvPicPr/>
           <p:nvPr/>
         </p:nvPicPr>

</xml_diff>